<commit_message>
boss enemy in devleopment
</commit_message>
<xml_diff>
--- a/Mechanics design document.pptx
+++ b/Mechanics design document.pptx
@@ -277,7 +277,7 @@
           <a:p>
             <a:fld id="{82825D99-0552-4D24-87B0-05A25F8D4113}" type="datetimeFigureOut">
               <a:rPr lang="en-GB" smtClean="0"/>
-              <a:t>09/02/2024</a:t>
+              <a:t>28/02/2024</a:t>
             </a:fld>
             <a:endParaRPr lang="en-GB"/>
           </a:p>
@@ -475,7 +475,7 @@
           <a:p>
             <a:fld id="{82825D99-0552-4D24-87B0-05A25F8D4113}" type="datetimeFigureOut">
               <a:rPr lang="en-GB" smtClean="0"/>
-              <a:t>09/02/2024</a:t>
+              <a:t>28/02/2024</a:t>
             </a:fld>
             <a:endParaRPr lang="en-GB"/>
           </a:p>
@@ -683,7 +683,7 @@
           <a:p>
             <a:fld id="{82825D99-0552-4D24-87B0-05A25F8D4113}" type="datetimeFigureOut">
               <a:rPr lang="en-GB" smtClean="0"/>
-              <a:t>09/02/2024</a:t>
+              <a:t>28/02/2024</a:t>
             </a:fld>
             <a:endParaRPr lang="en-GB"/>
           </a:p>
@@ -881,7 +881,7 @@
           <a:p>
             <a:fld id="{82825D99-0552-4D24-87B0-05A25F8D4113}" type="datetimeFigureOut">
               <a:rPr lang="en-GB" smtClean="0"/>
-              <a:t>09/02/2024</a:t>
+              <a:t>28/02/2024</a:t>
             </a:fld>
             <a:endParaRPr lang="en-GB"/>
           </a:p>
@@ -1156,7 +1156,7 @@
           <a:p>
             <a:fld id="{82825D99-0552-4D24-87B0-05A25F8D4113}" type="datetimeFigureOut">
               <a:rPr lang="en-GB" smtClean="0"/>
-              <a:t>09/02/2024</a:t>
+              <a:t>28/02/2024</a:t>
             </a:fld>
             <a:endParaRPr lang="en-GB"/>
           </a:p>
@@ -1421,7 +1421,7 @@
           <a:p>
             <a:fld id="{82825D99-0552-4D24-87B0-05A25F8D4113}" type="datetimeFigureOut">
               <a:rPr lang="en-GB" smtClean="0"/>
-              <a:t>09/02/2024</a:t>
+              <a:t>28/02/2024</a:t>
             </a:fld>
             <a:endParaRPr lang="en-GB"/>
           </a:p>
@@ -1833,7 +1833,7 @@
           <a:p>
             <a:fld id="{82825D99-0552-4D24-87B0-05A25F8D4113}" type="datetimeFigureOut">
               <a:rPr lang="en-GB" smtClean="0"/>
-              <a:t>09/02/2024</a:t>
+              <a:t>28/02/2024</a:t>
             </a:fld>
             <a:endParaRPr lang="en-GB"/>
           </a:p>
@@ -1974,7 +1974,7 @@
           <a:p>
             <a:fld id="{82825D99-0552-4D24-87B0-05A25F8D4113}" type="datetimeFigureOut">
               <a:rPr lang="en-GB" smtClean="0"/>
-              <a:t>09/02/2024</a:t>
+              <a:t>28/02/2024</a:t>
             </a:fld>
             <a:endParaRPr lang="en-GB"/>
           </a:p>
@@ -2087,7 +2087,7 @@
           <a:p>
             <a:fld id="{82825D99-0552-4D24-87B0-05A25F8D4113}" type="datetimeFigureOut">
               <a:rPr lang="en-GB" smtClean="0"/>
-              <a:t>09/02/2024</a:t>
+              <a:t>28/02/2024</a:t>
             </a:fld>
             <a:endParaRPr lang="en-GB"/>
           </a:p>
@@ -2398,7 +2398,7 @@
           <a:p>
             <a:fld id="{82825D99-0552-4D24-87B0-05A25F8D4113}" type="datetimeFigureOut">
               <a:rPr lang="en-GB" smtClean="0"/>
-              <a:t>09/02/2024</a:t>
+              <a:t>28/02/2024</a:t>
             </a:fld>
             <a:endParaRPr lang="en-GB"/>
           </a:p>
@@ -2686,7 +2686,7 @@
           <a:p>
             <a:fld id="{82825D99-0552-4D24-87B0-05A25F8D4113}" type="datetimeFigureOut">
               <a:rPr lang="en-GB" smtClean="0"/>
-              <a:t>09/02/2024</a:t>
+              <a:t>28/02/2024</a:t>
             </a:fld>
             <a:endParaRPr lang="en-GB"/>
           </a:p>
@@ -2927,7 +2927,7 @@
           <a:p>
             <a:fld id="{82825D99-0552-4D24-87B0-05A25F8D4113}" type="datetimeFigureOut">
               <a:rPr lang="en-GB" smtClean="0"/>
-              <a:t>09/02/2024</a:t>
+              <a:t>28/02/2024</a:t>
             </a:fld>
             <a:endParaRPr lang="en-GB"/>
           </a:p>

</xml_diff>